<commit_message>
Updating lec 21 slide deck
</commit_message>
<xml_diff>
--- a/tyler/meena/cs220/f20/materials/lec_21_F20.pptx
+++ b/tyler/meena/cs220/f20/materials/lec_21_F20.pptx
@@ -5,7 +5,7 @@
     <p:sldMasterId id="2147483648" r:id="rId1"/>
   </p:sldMasterIdLst>
   <p:notesMasterIdLst>
-    <p:notesMasterId r:id="rId54"/>
+    <p:notesMasterId r:id="rId55"/>
   </p:notesMasterIdLst>
   <p:sldIdLst>
     <p:sldId id="256" r:id="rId2"/>
@@ -33,33 +33,34 @@
     <p:sldId id="307" r:id="rId24"/>
     <p:sldId id="278" r:id="rId25"/>
     <p:sldId id="279" r:id="rId26"/>
-    <p:sldId id="280" r:id="rId27"/>
-    <p:sldId id="281" r:id="rId28"/>
-    <p:sldId id="282" r:id="rId29"/>
-    <p:sldId id="283" r:id="rId30"/>
-    <p:sldId id="284" r:id="rId31"/>
-    <p:sldId id="285" r:id="rId32"/>
-    <p:sldId id="286" r:id="rId33"/>
-    <p:sldId id="287" r:id="rId34"/>
-    <p:sldId id="288" r:id="rId35"/>
-    <p:sldId id="289" r:id="rId36"/>
-    <p:sldId id="290" r:id="rId37"/>
-    <p:sldId id="291" r:id="rId38"/>
-    <p:sldId id="292" r:id="rId39"/>
-    <p:sldId id="293" r:id="rId40"/>
-    <p:sldId id="294" r:id="rId41"/>
-    <p:sldId id="295" r:id="rId42"/>
-    <p:sldId id="296" r:id="rId43"/>
-    <p:sldId id="297" r:id="rId44"/>
-    <p:sldId id="298" r:id="rId45"/>
-    <p:sldId id="299" r:id="rId46"/>
-    <p:sldId id="300" r:id="rId47"/>
-    <p:sldId id="301" r:id="rId48"/>
-    <p:sldId id="302" r:id="rId49"/>
-    <p:sldId id="303" r:id="rId50"/>
-    <p:sldId id="304" r:id="rId51"/>
-    <p:sldId id="305" r:id="rId52"/>
-    <p:sldId id="306" r:id="rId53"/>
+    <p:sldId id="308" r:id="rId27"/>
+    <p:sldId id="280" r:id="rId28"/>
+    <p:sldId id="281" r:id="rId29"/>
+    <p:sldId id="282" r:id="rId30"/>
+    <p:sldId id="283" r:id="rId31"/>
+    <p:sldId id="284" r:id="rId32"/>
+    <p:sldId id="285" r:id="rId33"/>
+    <p:sldId id="286" r:id="rId34"/>
+    <p:sldId id="287" r:id="rId35"/>
+    <p:sldId id="288" r:id="rId36"/>
+    <p:sldId id="289" r:id="rId37"/>
+    <p:sldId id="290" r:id="rId38"/>
+    <p:sldId id="291" r:id="rId39"/>
+    <p:sldId id="292" r:id="rId40"/>
+    <p:sldId id="293" r:id="rId41"/>
+    <p:sldId id="294" r:id="rId42"/>
+    <p:sldId id="295" r:id="rId43"/>
+    <p:sldId id="296" r:id="rId44"/>
+    <p:sldId id="297" r:id="rId45"/>
+    <p:sldId id="298" r:id="rId46"/>
+    <p:sldId id="299" r:id="rId47"/>
+    <p:sldId id="300" r:id="rId48"/>
+    <p:sldId id="301" r:id="rId49"/>
+    <p:sldId id="302" r:id="rId50"/>
+    <p:sldId id="303" r:id="rId51"/>
+    <p:sldId id="304" r:id="rId52"/>
+    <p:sldId id="305" r:id="rId53"/>
+    <p:sldId id="306" r:id="rId54"/>
   </p:sldIdLst>
   <p:sldSz cx="13004800" cy="9753600"/>
   <p:notesSz cx="6858000" cy="9144000"/>
@@ -3379,19 +3380,8 @@
                 <a:latin typeface="Helvetica Neue" panose="02000503000000020004" pitchFamily="2" charset="0"/>
                 <a:sym typeface="Helvetica Neue" panose="02000503000000020004" pitchFamily="2" charset="0"/>
               </a:rPr>
-              <a:t>14 suspicious works </a:t>
-            </a:r>
-            <a:r>
-              <a:rPr lang="en-US" altLang="en-US">
-                <a:latin typeface="Helvetica Neue" panose="02000503000000020004" pitchFamily="2" charset="0"/>
-                <a:sym typeface="Helvetica Neue" panose="02000503000000020004" pitchFamily="2" charset="0"/>
-              </a:rPr>
-              <a:t>for P6</a:t>
-            </a:r>
-            <a:endParaRPr lang="en-US" altLang="en-US" dirty="0">
-              <a:latin typeface="Helvetica Neue" panose="02000503000000020004" pitchFamily="2" charset="0"/>
-              <a:sym typeface="Helvetica Neue" panose="02000503000000020004" pitchFamily="2" charset="0"/>
-            </a:endParaRPr>
+              <a:t>14 suspicious works for P6</a:t>
+            </a:r>
           </a:p>
           <a:p>
             <a:r>
@@ -5429,7 +5419,7 @@
               </a:defRPr>
             </a:pPr>
             <a:r>
-              <a:rPr>
+              <a:rPr dirty="0">
                 <a:solidFill>
                   <a:schemeClr val="accent5">
                     <a:hueOff val="-82419"/>
@@ -5441,6 +5431,7 @@
               <a:t>x</a:t>
             </a:r>
             <a:r>
+              <a:rPr dirty="0"/>
               <a:t> = {}</a:t>
             </a:r>
           </a:p>
@@ -5456,7 +5447,7 @@
               </a:defRPr>
             </a:pPr>
             <a:r>
-              <a:rPr>
+              <a:rPr dirty="0">
                 <a:solidFill>
                   <a:schemeClr val="accent5">
                     <a:hueOff val="-82419"/>
@@ -5468,10 +5459,11 @@
               <a:t>y</a:t>
             </a:r>
             <a:r>
+              <a:rPr dirty="0"/>
               <a:t> = </a:t>
             </a:r>
             <a:r>
-              <a:rPr>
+              <a:rPr dirty="0">
                 <a:solidFill>
                   <a:schemeClr val="accent5">
                     <a:hueOff val="-82419"/>
@@ -5498,7 +5490,7 @@
               </a:defRPr>
             </a:pPr>
             <a:r>
-              <a:rPr>
+              <a:rPr dirty="0">
                 <a:solidFill>
                   <a:schemeClr val="accent5">
                     <a:hueOff val="-82419"/>
@@ -5510,6 +5502,7 @@
               <a:t>y</a:t>
             </a:r>
             <a:r>
+              <a:rPr dirty="0"/>
               <a:t>["WI"] = "Madison"</a:t>
             </a:r>
           </a:p>
@@ -5528,10 +5521,11 @@
               </a:defRPr>
             </a:pPr>
             <a:r>
+              <a:rPr dirty="0"/>
               <a:t>print(</a:t>
             </a:r>
             <a:r>
-              <a:rPr>
+              <a:rPr dirty="0">
                 <a:solidFill>
                   <a:schemeClr val="accent5">
                     <a:hueOff val="-82419"/>
@@ -5543,6 +5537,7 @@
               <a:t>x</a:t>
             </a:r>
             <a:r>
+              <a:rPr dirty="0"/>
               <a:t>["WI"])</a:t>
             </a:r>
           </a:p>
@@ -5971,10 +5966,11 @@
               </a:defRPr>
             </a:pPr>
             <a:r>
+              <a:rPr dirty="0"/>
               <a:t>def foo(</a:t>
             </a:r>
             <a:r>
-              <a:rPr>
+              <a:rPr dirty="0" err="1">
                 <a:solidFill>
                   <a:schemeClr val="accent5">
                     <a:hueOff val="-82419"/>
@@ -5986,6 +5982,7 @@
               <a:t>nums</a:t>
             </a:r>
             <a:r>
+              <a:rPr dirty="0"/>
               <a:t>):</a:t>
             </a:r>
           </a:p>
@@ -6004,10 +6001,11 @@
               </a:defRPr>
             </a:pPr>
             <a:r>
+              <a:rPr dirty="0"/>
               <a:t>    </a:t>
             </a:r>
             <a:r>
-              <a:rPr>
+              <a:rPr dirty="0" err="1">
                 <a:solidFill>
                   <a:schemeClr val="accent5">
                     <a:hueOff val="-82419"/>
@@ -6019,7 +6017,12 @@
               <a:t>nums</a:t>
             </a:r>
             <a:r>
-              <a:t>.append(3)</a:t>
+              <a:rPr dirty="0" err="1"/>
+              <a:t>.append</a:t>
+            </a:r>
+            <a:r>
+              <a:rPr dirty="0"/>
+              <a:t>(3)</a:t>
             </a:r>
           </a:p>
           <a:p>
@@ -6037,10 +6040,11 @@
               </a:defRPr>
             </a:pPr>
             <a:r>
+              <a:rPr dirty="0"/>
               <a:t>    print(</a:t>
             </a:r>
             <a:r>
-              <a:rPr>
+              <a:rPr dirty="0" err="1">
                 <a:solidFill>
                   <a:schemeClr val="accent5">
                     <a:hueOff val="-82419"/>
@@ -6052,6 +6056,7 @@
               <a:t>nums</a:t>
             </a:r>
             <a:r>
+              <a:rPr dirty="0"/>
               <a:t>)</a:t>
             </a:r>
           </a:p>
@@ -6070,7 +6075,7 @@
               </a:defRPr>
             </a:pPr>
             <a:r>
-              <a:rPr>
+              <a:rPr dirty="0">
                 <a:solidFill>
                   <a:schemeClr val="accent5">
                     <a:hueOff val="-82419"/>
@@ -6082,6 +6087,7 @@
               <a:t>items</a:t>
             </a:r>
             <a:r>
+              <a:rPr dirty="0"/>
               <a:t> = [1,2]</a:t>
             </a:r>
           </a:p>
@@ -6100,7 +6106,7 @@
               </a:defRPr>
             </a:pPr>
             <a:r>
-              <a:rPr>
+              <a:rPr dirty="0">
                 <a:solidFill>
                   <a:schemeClr val="accent5">
                     <a:hueOff val="-82419"/>
@@ -6112,10 +6118,11 @@
               <a:t>numbers</a:t>
             </a:r>
             <a:r>
+              <a:rPr dirty="0"/>
               <a:t> = </a:t>
             </a:r>
             <a:r>
-              <a:rPr>
+              <a:rPr dirty="0">
                 <a:solidFill>
                   <a:schemeClr val="accent5">
                     <a:hueOff val="-82419"/>
@@ -6142,10 +6149,11 @@
               </a:defRPr>
             </a:pPr>
             <a:r>
+              <a:rPr dirty="0"/>
               <a:t>foo(</a:t>
             </a:r>
             <a:r>
-              <a:rPr>
+              <a:rPr dirty="0">
                 <a:solidFill>
                   <a:schemeClr val="accent5">
                     <a:hueOff val="-82419"/>
@@ -6157,6 +6165,7 @@
               <a:t>numbers</a:t>
             </a:r>
             <a:r>
+              <a:rPr dirty="0"/>
               <a:t>)</a:t>
             </a:r>
           </a:p>
@@ -6175,10 +6184,11 @@
               </a:defRPr>
             </a:pPr>
             <a:r>
+              <a:rPr dirty="0"/>
               <a:t>print(</a:t>
             </a:r>
             <a:r>
-              <a:rPr>
+              <a:rPr dirty="0">
                 <a:solidFill>
                   <a:schemeClr val="accent5">
                     <a:hueOff val="-82419"/>
@@ -6190,6 +6200,7 @@
               <a:t>items</a:t>
             </a:r>
             <a:r>
+              <a:rPr dirty="0"/>
               <a:t>)</a:t>
             </a:r>
           </a:p>
@@ -6208,10 +6219,11 @@
               </a:defRPr>
             </a:pPr>
             <a:r>
+              <a:rPr dirty="0"/>
               <a:t>print(</a:t>
             </a:r>
             <a:r>
-              <a:rPr>
+              <a:rPr dirty="0">
                 <a:solidFill>
                   <a:schemeClr val="accent5">
                     <a:hueOff val="-82419"/>
@@ -6223,6 +6235,7 @@
               <a:t>numbers</a:t>
             </a:r>
             <a:r>
+              <a:rPr dirty="0"/>
               <a:t>)</a:t>
             </a:r>
           </a:p>
@@ -6651,7 +6664,7 @@
               </a:defRPr>
             </a:pPr>
             <a:r>
-              <a:rPr>
+              <a:rPr dirty="0">
                 <a:solidFill>
                   <a:schemeClr val="accent5">
                     <a:hueOff val="-82419"/>
@@ -6663,7 +6676,24 @@
               <a:t>x</a:t>
             </a:r>
             <a:r>
-              <a:t> = ["aaa", "bbb"]</a:t>
+              <a:rPr dirty="0"/>
+              <a:t> = ["</a:t>
+            </a:r>
+            <a:r>
+              <a:rPr dirty="0" err="1"/>
+              <a:t>aaa</a:t>
+            </a:r>
+            <a:r>
+              <a:rPr dirty="0"/>
+              <a:t>", "</a:t>
+            </a:r>
+            <a:r>
+              <a:rPr dirty="0" err="1"/>
+              <a:t>bbb</a:t>
+            </a:r>
+            <a:r>
+              <a:rPr dirty="0"/>
+              <a:t>"]</a:t>
             </a:r>
           </a:p>
           <a:p>
@@ -6681,7 +6711,7 @@
               </a:defRPr>
             </a:pPr>
             <a:r>
-              <a:rPr>
+              <a:rPr dirty="0">
                 <a:solidFill>
                   <a:schemeClr val="accent5">
                     <a:hueOff val="-82419"/>
@@ -6693,10 +6723,11 @@
               <a:t>y</a:t>
             </a:r>
             <a:r>
+              <a:rPr dirty="0"/>
               <a:t> = </a:t>
             </a:r>
             <a:r>
-              <a:rPr>
+              <a:rPr dirty="0">
                 <a:solidFill>
                   <a:schemeClr val="accent5">
                     <a:hueOff val="-82419"/>
@@ -6708,6 +6739,7 @@
               <a:t>x</a:t>
             </a:r>
             <a:r>
+              <a:rPr dirty="0"/>
               <a:t>[:]</a:t>
             </a:r>
           </a:p>
@@ -6726,7 +6758,7 @@
               </a:defRPr>
             </a:pPr>
             <a:r>
-              <a:rPr>
+              <a:rPr dirty="0" err="1">
                 <a:solidFill>
                   <a:schemeClr val="accent5">
                     <a:hueOff val="-82419"/>
@@ -6738,7 +6770,12 @@
               <a:t>x</a:t>
             </a:r>
             <a:r>
-              <a:t>.pop(0)</a:t>
+              <a:rPr dirty="0" err="1"/>
+              <a:t>.pop</a:t>
+            </a:r>
+            <a:r>
+              <a:rPr dirty="0"/>
+              <a:t>(0)</a:t>
             </a:r>
           </a:p>
           <a:p>
@@ -6756,10 +6793,19 @@
               </a:defRPr>
             </a:pPr>
             <a:r>
-              <a:t>print(len(</a:t>
-            </a:r>
-            <a:r>
-              <a:rPr>
+              <a:rPr dirty="0"/>
+              <a:t>print(</a:t>
+            </a:r>
+            <a:r>
+              <a:rPr dirty="0" err="1"/>
+              <a:t>len</a:t>
+            </a:r>
+            <a:r>
+              <a:rPr dirty="0"/>
+              <a:t>(</a:t>
+            </a:r>
+            <a:r>
+              <a:rPr dirty="0">
                 <a:solidFill>
                   <a:schemeClr val="accent5">
                     <a:hueOff val="-82419"/>
@@ -6771,6 +6817,7 @@
               <a:t>y</a:t>
             </a:r>
             <a:r>
+              <a:rPr dirty="0"/>
               <a:t>))</a:t>
             </a:r>
           </a:p>
@@ -17291,6 +17338,647 @@
       </p:grpSpPr>
       <p:sp>
         <p:nvSpPr>
+          <p:cNvPr id="431" name="Three Levels of Copy"/>
+          <p:cNvSpPr txBox="1">
+            <a:spLocks noGrp="1"/>
+          </p:cNvSpPr>
+          <p:nvPr>
+            <p:ph type="title"/>
+          </p:nvPr>
+        </p:nvSpPr>
+        <p:spPr>
+          <a:xfrm>
+            <a:off x="952500" y="254000"/>
+            <a:ext cx="11099800" cy="902345"/>
+          </a:xfrm>
+          <a:prstGeom prst="rect">
+            <a:avLst/>
+          </a:prstGeom>
+        </p:spPr>
+        <p:txBody>
+          <a:bodyPr/>
+          <a:lstStyle>
+            <a:lvl1pPr algn="l">
+              <a:defRPr sz="4800"/>
+            </a:lvl1pPr>
+          </a:lstStyle>
+          <a:p>
+            <a:r>
+              <a:rPr lang="en-US" dirty="0"/>
+              <a:t>Shallow copy of depth level 2</a:t>
+            </a:r>
+            <a:endParaRPr dirty="0"/>
+          </a:p>
+        </p:txBody>
+      </p:sp>
+      <p:sp>
+        <p:nvSpPr>
+          <p:cNvPr id="432" name="import copy…"/>
+          <p:cNvSpPr txBox="1">
+            <a:spLocks noGrp="1"/>
+          </p:cNvSpPr>
+          <p:nvPr>
+            <p:ph type="body" idx="1"/>
+          </p:nvPr>
+        </p:nvSpPr>
+        <p:spPr>
+          <a:xfrm>
+            <a:off x="1104900" y="3683396"/>
+            <a:ext cx="11099800" cy="5330281"/>
+          </a:xfrm>
+          <a:prstGeom prst="rect">
+            <a:avLst/>
+          </a:prstGeom>
+        </p:spPr>
+        <p:txBody>
+          <a:bodyPr anchor="t"/>
+          <a:lstStyle/>
+          <a:p>
+            <a:pPr marL="0" lvl="5" indent="0">
+              <a:spcBef>
+                <a:spcPts val="0"/>
+              </a:spcBef>
+              <a:buSzTx/>
+              <a:buNone/>
+              <a:defRPr sz="2800">
+                <a:latin typeface="Courier"/>
+                <a:ea typeface="Courier"/>
+                <a:cs typeface="Courier"/>
+                <a:sym typeface="Courier"/>
+              </a:defRPr>
+            </a:pPr>
+            <a:r>
+              <a:rPr lang="en-US" dirty="0"/>
+              <a:t>import copy</a:t>
+            </a:r>
+          </a:p>
+          <a:p>
+            <a:pPr marL="0" lvl="5" indent="0">
+              <a:spcBef>
+                <a:spcPts val="0"/>
+              </a:spcBef>
+              <a:buSzTx/>
+              <a:buNone/>
+              <a:defRPr sz="2800">
+                <a:latin typeface="Courier"/>
+                <a:ea typeface="Courier"/>
+                <a:cs typeface="Courier"/>
+                <a:sym typeface="Courier"/>
+              </a:defRPr>
+            </a:pPr>
+            <a:r>
+              <a:rPr lang="en-US" dirty="0"/>
+              <a:t>x = [</a:t>
+            </a:r>
+          </a:p>
+          <a:p>
+            <a:pPr marL="0" lvl="5" indent="0">
+              <a:spcBef>
+                <a:spcPts val="0"/>
+              </a:spcBef>
+              <a:buSzTx/>
+              <a:buNone/>
+              <a:defRPr sz="2800">
+                <a:latin typeface="Courier"/>
+                <a:ea typeface="Courier"/>
+                <a:cs typeface="Courier"/>
+                <a:sym typeface="Courier"/>
+              </a:defRPr>
+            </a:pPr>
+            <a:r>
+              <a:rPr lang="en-US" dirty="0"/>
+              <a:t>    {"</a:t>
+            </a:r>
+            <a:r>
+              <a:rPr lang="en-US" dirty="0" err="1"/>
+              <a:t>name":"A</a:t>
+            </a:r>
+            <a:r>
+              <a:rPr lang="en-US" dirty="0"/>
+              <a:t>", "score":88},</a:t>
+            </a:r>
+          </a:p>
+          <a:p>
+            <a:pPr marL="0" lvl="5" indent="0">
+              <a:spcBef>
+                <a:spcPts val="0"/>
+              </a:spcBef>
+              <a:buSzTx/>
+              <a:buNone/>
+              <a:defRPr sz="2800">
+                <a:latin typeface="Courier"/>
+                <a:ea typeface="Courier"/>
+                <a:cs typeface="Courier"/>
+                <a:sym typeface="Courier"/>
+              </a:defRPr>
+            </a:pPr>
+            <a:r>
+              <a:rPr lang="en-US" dirty="0"/>
+              <a:t>    {"</a:t>
+            </a:r>
+            <a:r>
+              <a:rPr lang="en-US" dirty="0" err="1"/>
+              <a:t>name":"B</a:t>
+            </a:r>
+            <a:r>
+              <a:rPr lang="en-US" dirty="0"/>
+              <a:t>", "score":111},</a:t>
+            </a:r>
+          </a:p>
+          <a:p>
+            <a:pPr marL="0" lvl="5" indent="0">
+              <a:spcBef>
+                <a:spcPts val="0"/>
+              </a:spcBef>
+              <a:buSzTx/>
+              <a:buNone/>
+              <a:defRPr sz="2800">
+                <a:latin typeface="Courier"/>
+                <a:ea typeface="Courier"/>
+                <a:cs typeface="Courier"/>
+                <a:sym typeface="Courier"/>
+              </a:defRPr>
+            </a:pPr>
+            <a:r>
+              <a:rPr lang="en-US" dirty="0"/>
+              <a:t>    {"</a:t>
+            </a:r>
+            <a:r>
+              <a:rPr lang="en-US" dirty="0" err="1"/>
+              <a:t>name":"C</a:t>
+            </a:r>
+            <a:r>
+              <a:rPr lang="en-US" dirty="0"/>
+              <a:t>", "score":100}]</a:t>
+            </a:r>
+          </a:p>
+          <a:p>
+            <a:pPr marL="0" lvl="5" indent="0">
+              <a:spcBef>
+                <a:spcPts val="0"/>
+              </a:spcBef>
+              <a:buSzTx/>
+              <a:buNone/>
+              <a:defRPr sz="2800">
+                <a:latin typeface="Courier"/>
+                <a:ea typeface="Courier"/>
+                <a:cs typeface="Courier"/>
+                <a:sym typeface="Courier"/>
+              </a:defRPr>
+            </a:pPr>
+            <a:endParaRPr lang="en-US" dirty="0"/>
+          </a:p>
+          <a:p>
+            <a:pPr marL="0" lvl="5" indent="0">
+              <a:spcBef>
+                <a:spcPts val="0"/>
+              </a:spcBef>
+              <a:buSzTx/>
+              <a:buNone/>
+              <a:defRPr sz="2800">
+                <a:latin typeface="Courier"/>
+                <a:ea typeface="Courier"/>
+                <a:cs typeface="Courier"/>
+                <a:sym typeface="Courier"/>
+              </a:defRPr>
+            </a:pPr>
+            <a:r>
+              <a:rPr lang="en-US" dirty="0"/>
+              <a:t>y = </a:t>
+            </a:r>
+            <a:r>
+              <a:rPr lang="en-US" dirty="0" err="1"/>
+              <a:t>copy.copy</a:t>
+            </a:r>
+            <a:r>
+              <a:rPr lang="en-US" dirty="0"/>
+              <a:t>(x)</a:t>
+            </a:r>
+          </a:p>
+          <a:p>
+            <a:pPr marL="0" lvl="5" indent="0">
+              <a:spcBef>
+                <a:spcPts val="0"/>
+              </a:spcBef>
+              <a:buSzTx/>
+              <a:buNone/>
+              <a:defRPr sz="2800">
+                <a:latin typeface="Courier"/>
+                <a:ea typeface="Courier"/>
+                <a:cs typeface="Courier"/>
+                <a:sym typeface="Courier"/>
+              </a:defRPr>
+            </a:pPr>
+            <a:endParaRPr lang="en-US" dirty="0"/>
+          </a:p>
+          <a:p>
+            <a:pPr marL="0" lvl="5" indent="0">
+              <a:spcBef>
+                <a:spcPts val="0"/>
+              </a:spcBef>
+              <a:buSzTx/>
+              <a:buNone/>
+              <a:defRPr sz="2800">
+                <a:latin typeface="Courier"/>
+                <a:ea typeface="Courier"/>
+                <a:cs typeface="Courier"/>
+                <a:sym typeface="Courier"/>
+              </a:defRPr>
+            </a:pPr>
+            <a:r>
+              <a:rPr lang="en-US" dirty="0"/>
+              <a:t>for </a:t>
+            </a:r>
+            <a:r>
+              <a:rPr lang="en-US" dirty="0" err="1"/>
+              <a:t>idx</a:t>
+            </a:r>
+            <a:r>
+              <a:rPr lang="en-US" dirty="0"/>
+              <a:t> in range(</a:t>
+            </a:r>
+            <a:r>
+              <a:rPr lang="en-US" dirty="0" err="1"/>
+              <a:t>len</a:t>
+            </a:r>
+            <a:r>
+              <a:rPr lang="en-US" dirty="0"/>
+              <a:t>(x)):</a:t>
+            </a:r>
+          </a:p>
+          <a:p>
+            <a:pPr marL="0" lvl="5" indent="0">
+              <a:spcBef>
+                <a:spcPts val="0"/>
+              </a:spcBef>
+              <a:buSzTx/>
+              <a:buNone/>
+              <a:defRPr sz="2800">
+                <a:latin typeface="Courier"/>
+                <a:ea typeface="Courier"/>
+                <a:cs typeface="Courier"/>
+                <a:sym typeface="Courier"/>
+              </a:defRPr>
+            </a:pPr>
+            <a:r>
+              <a:rPr lang="en-US" dirty="0"/>
+              <a:t>    y[</a:t>
+            </a:r>
+            <a:r>
+              <a:rPr lang="en-US" dirty="0" err="1"/>
+              <a:t>idx</a:t>
+            </a:r>
+            <a:r>
+              <a:rPr lang="en-US" dirty="0"/>
+              <a:t>] = </a:t>
+            </a:r>
+            <a:r>
+              <a:rPr lang="en-US" dirty="0" err="1"/>
+              <a:t>copy.copy</a:t>
+            </a:r>
+            <a:r>
+              <a:rPr lang="en-US" dirty="0"/>
+              <a:t>(x[</a:t>
+            </a:r>
+            <a:r>
+              <a:rPr lang="en-US" dirty="0" err="1"/>
+              <a:t>idx</a:t>
+            </a:r>
+            <a:r>
+              <a:rPr lang="en-US" dirty="0"/>
+              <a:t>])</a:t>
+            </a:r>
+          </a:p>
+        </p:txBody>
+      </p:sp>
+      <p:sp>
+        <p:nvSpPr>
+          <p:cNvPr id="435" name="Line"/>
+          <p:cNvSpPr/>
+          <p:nvPr/>
+        </p:nvSpPr>
+        <p:spPr>
+          <a:xfrm flipH="1">
+            <a:off x="4675706" y="6546137"/>
+            <a:ext cx="4087182" cy="0"/>
+          </a:xfrm>
+          <a:prstGeom prst="line">
+            <a:avLst/>
+          </a:prstGeom>
+          <a:ln w="38100">
+            <a:solidFill>
+              <a:schemeClr val="accent5">
+                <a:hueOff val="-82419"/>
+                <a:satOff val="-9513"/>
+                <a:lumOff val="-16343"/>
+              </a:schemeClr>
+            </a:solidFill>
+            <a:miter lim="400000"/>
+            <a:tailEnd type="triangle"/>
+          </a:ln>
+        </p:spPr>
+        <p:txBody>
+          <a:bodyPr lIns="50800" tIns="50800" rIns="50800" bIns="50800" anchor="ctr"/>
+          <a:lstStyle/>
+          <a:p>
+            <a:pPr>
+              <a:defRPr sz="2200" b="0">
+                <a:solidFill>
+                  <a:srgbClr val="FFFFFF"/>
+                </a:solidFill>
+                <a:latin typeface="+mn-lt"/>
+                <a:ea typeface="+mn-ea"/>
+                <a:cs typeface="+mn-cs"/>
+                <a:sym typeface="Gill Sans SemiBold"/>
+              </a:defRPr>
+            </a:pPr>
+            <a:endParaRPr/>
+          </a:p>
+        </p:txBody>
+      </p:sp>
+      <p:sp>
+        <p:nvSpPr>
+          <p:cNvPr id="436" name="shallow copy"/>
+          <p:cNvSpPr txBox="1"/>
+          <p:nvPr/>
+        </p:nvSpPr>
+        <p:spPr>
+          <a:xfrm>
+            <a:off x="8813335" y="6317537"/>
+            <a:ext cx="1693665" cy="457201"/>
+          </a:xfrm>
+          <a:prstGeom prst="rect">
+            <a:avLst/>
+          </a:prstGeom>
+          <a:ln w="12700">
+            <a:miter lim="400000"/>
+          </a:ln>
+          <a:extLst>
+            <a:ext uri="{C572A759-6A51-4108-AA02-DFA0A04FC94B}">
+              <ma14:wrappingTextBoxFlag xmlns:ma14="http://schemas.microsoft.com/office/mac/drawingml/2011/main" xmlns:a14="http://schemas.microsoft.com/office/drawing/2010/main" xmlns:m="http://schemas.openxmlformats.org/officeDocument/2006/math" xmlns="" val="1"/>
+            </a:ext>
+          </a:extLst>
+        </p:spPr>
+        <p:txBody>
+          <a:bodyPr wrap="none" lIns="50800" tIns="50800" rIns="50800" bIns="50800" anchor="ctr">
+            <a:spAutoFit/>
+          </a:bodyPr>
+          <a:lstStyle>
+            <a:lvl1pPr algn="l">
+              <a:defRPr b="0">
+                <a:solidFill>
+                  <a:schemeClr val="accent5">
+                    <a:hueOff val="-82419"/>
+                    <a:satOff val="-9513"/>
+                    <a:lumOff val="-16343"/>
+                  </a:schemeClr>
+                </a:solidFill>
+              </a:defRPr>
+            </a:lvl1pPr>
+          </a:lstStyle>
+          <a:p>
+            <a:r>
+              <a:rPr dirty="0"/>
+              <a:t>shallow copy</a:t>
+            </a:r>
+          </a:p>
+        </p:txBody>
+      </p:sp>
+      <p:sp>
+        <p:nvSpPr>
+          <p:cNvPr id="439" name="When should we…"/>
+          <p:cNvSpPr txBox="1"/>
+          <p:nvPr/>
+        </p:nvSpPr>
+        <p:spPr>
+          <a:xfrm>
+            <a:off x="6936194" y="2821095"/>
+            <a:ext cx="5990422" cy="1579920"/>
+          </a:xfrm>
+          <a:prstGeom prst="rect">
+            <a:avLst/>
+          </a:prstGeom>
+          <a:ln w="12700">
+            <a:miter lim="400000"/>
+          </a:ln>
+          <a:extLst>
+            <a:ext uri="{C572A759-6A51-4108-AA02-DFA0A04FC94B}">
+              <ma14:wrappingTextBoxFlag xmlns:ma14="http://schemas.microsoft.com/office/mac/drawingml/2011/main" xmlns:a14="http://schemas.microsoft.com/office/drawing/2010/main" xmlns:m="http://schemas.openxmlformats.org/officeDocument/2006/math" xmlns="" val="1"/>
+            </a:ext>
+          </a:extLst>
+        </p:spPr>
+        <p:txBody>
+          <a:bodyPr wrap="none" lIns="50800" tIns="50800" rIns="50800" bIns="50800" anchor="ctr">
+            <a:spAutoFit/>
+          </a:bodyPr>
+          <a:lstStyle/>
+          <a:p>
+            <a:pPr>
+              <a:defRPr sz="4800" b="0">
+                <a:solidFill>
+                  <a:schemeClr val="accent5">
+                    <a:hueOff val="-82419"/>
+                    <a:satOff val="-9513"/>
+                    <a:lumOff val="-16343"/>
+                  </a:schemeClr>
+                </a:solidFill>
+              </a:defRPr>
+            </a:pPr>
+            <a:r>
+              <a:rPr lang="en-US" dirty="0"/>
+              <a:t>Using shallow copy to </a:t>
+            </a:r>
+          </a:p>
+          <a:p>
+            <a:pPr>
+              <a:defRPr sz="4800" b="0">
+                <a:solidFill>
+                  <a:schemeClr val="accent5">
+                    <a:hueOff val="-82419"/>
+                    <a:satOff val="-9513"/>
+                    <a:lumOff val="-16343"/>
+                  </a:schemeClr>
+                </a:solidFill>
+              </a:defRPr>
+            </a:pPr>
+            <a:r>
+              <a:rPr lang="en-US" dirty="0"/>
+              <a:t>copy other depth levels</a:t>
+            </a:r>
+            <a:endParaRPr dirty="0"/>
+          </a:p>
+        </p:txBody>
+      </p:sp>
+      <p:pic>
+        <p:nvPicPr>
+          <p:cNvPr id="440" name="Image" descr="Image"/>
+          <p:cNvPicPr>
+            <a:picLocks noChangeAspect="1"/>
+          </p:cNvPicPr>
+          <p:nvPr/>
+        </p:nvPicPr>
+        <p:blipFill>
+          <a:blip r:embed="rId2"/>
+          <a:stretch>
+            <a:fillRect/>
+          </a:stretch>
+        </p:blipFill>
+        <p:spPr>
+          <a:xfrm>
+            <a:off x="10236200" y="413792"/>
+            <a:ext cx="2164384" cy="1002258"/>
+          </a:xfrm>
+          <a:prstGeom prst="rect">
+            <a:avLst/>
+          </a:prstGeom>
+          <a:ln w="12700">
+            <a:miter lim="400000"/>
+          </a:ln>
+        </p:spPr>
+      </p:pic>
+      <p:sp>
+        <p:nvSpPr>
+          <p:cNvPr id="12" name="Line">
+            <a:extLst>
+              <a:ext uri="{FF2B5EF4-FFF2-40B4-BE49-F238E27FC236}">
+                <a16:creationId xmlns:a16="http://schemas.microsoft.com/office/drawing/2014/main" id="{74C3708F-587E-F741-82CB-C70376C8535E}"/>
+              </a:ext>
+            </a:extLst>
+          </p:cNvPr>
+          <p:cNvSpPr/>
+          <p:nvPr/>
+        </p:nvSpPr>
+        <p:spPr>
+          <a:xfrm flipH="1">
+            <a:off x="6502400" y="7364099"/>
+            <a:ext cx="2260488" cy="0"/>
+          </a:xfrm>
+          <a:prstGeom prst="line">
+            <a:avLst/>
+          </a:prstGeom>
+          <a:ln w="38100">
+            <a:solidFill>
+              <a:schemeClr val="accent5">
+                <a:hueOff val="-82419"/>
+                <a:satOff val="-9513"/>
+                <a:lumOff val="-16343"/>
+              </a:schemeClr>
+            </a:solidFill>
+            <a:miter lim="400000"/>
+            <a:tailEnd type="triangle"/>
+          </a:ln>
+        </p:spPr>
+        <p:txBody>
+          <a:bodyPr lIns="50800" tIns="50800" rIns="50800" bIns="50800" anchor="ctr"/>
+          <a:lstStyle/>
+          <a:p>
+            <a:pPr>
+              <a:defRPr sz="2200" b="0">
+                <a:solidFill>
+                  <a:srgbClr val="FFFFFF"/>
+                </a:solidFill>
+                <a:latin typeface="+mn-lt"/>
+                <a:ea typeface="+mn-ea"/>
+                <a:cs typeface="+mn-cs"/>
+                <a:sym typeface="Gill Sans SemiBold"/>
+              </a:defRPr>
+            </a:pPr>
+            <a:endParaRPr/>
+          </a:p>
+        </p:txBody>
+      </p:sp>
+      <p:sp>
+        <p:nvSpPr>
+          <p:cNvPr id="13" name="shallow copy">
+            <a:extLst>
+              <a:ext uri="{FF2B5EF4-FFF2-40B4-BE49-F238E27FC236}">
+                <a16:creationId xmlns:a16="http://schemas.microsoft.com/office/drawing/2014/main" id="{F6CE9476-648C-0248-9F93-63777A47C2A0}"/>
+              </a:ext>
+            </a:extLst>
+          </p:cNvPr>
+          <p:cNvSpPr txBox="1"/>
+          <p:nvPr/>
+        </p:nvSpPr>
+        <p:spPr>
+          <a:xfrm>
+            <a:off x="8813335" y="7128137"/>
+            <a:ext cx="3730188" cy="471924"/>
+          </a:xfrm>
+          <a:prstGeom prst="rect">
+            <a:avLst/>
+          </a:prstGeom>
+          <a:ln w="12700">
+            <a:miter lim="400000"/>
+          </a:ln>
+          <a:extLst>
+            <a:ext uri="{C572A759-6A51-4108-AA02-DFA0A04FC94B}">
+              <ma14:wrappingTextBoxFlag xmlns:ma14="http://schemas.microsoft.com/office/mac/drawingml/2011/main" xmlns:a14="http://schemas.microsoft.com/office/drawing/2010/main" xmlns:m="http://schemas.openxmlformats.org/officeDocument/2006/math" xmlns="" val="1"/>
+            </a:ext>
+          </a:extLst>
+        </p:spPr>
+        <p:txBody>
+          <a:bodyPr wrap="none" lIns="50800" tIns="50800" rIns="50800" bIns="50800" anchor="ctr">
+            <a:spAutoFit/>
+          </a:bodyPr>
+          <a:lstStyle>
+            <a:lvl1pPr algn="l">
+              <a:defRPr b="0">
+                <a:solidFill>
+                  <a:schemeClr val="accent5">
+                    <a:hueOff val="-82419"/>
+                    <a:satOff val="-9513"/>
+                    <a:lumOff val="-16343"/>
+                  </a:schemeClr>
+                </a:solidFill>
+              </a:defRPr>
+            </a:lvl1pPr>
+          </a:lstStyle>
+          <a:p>
+            <a:r>
+              <a:rPr dirty="0"/>
+              <a:t>shallow copy</a:t>
+            </a:r>
+            <a:r>
+              <a:rPr lang="en-US" dirty="0"/>
+              <a:t> of depth level 2</a:t>
+            </a:r>
+            <a:endParaRPr dirty="0"/>
+          </a:p>
+        </p:txBody>
+      </p:sp>
+    </p:spTree>
+    <p:extLst>
+      <p:ext uri="{BB962C8B-B14F-4D97-AF65-F5344CB8AC3E}">
+        <p14:creationId xmlns:p14="http://schemas.microsoft.com/office/powerpoint/2010/main" val="1957659482"/>
+      </p:ext>
+    </p:extLst>
+  </p:cSld>
+  <p:clrMapOvr>
+    <a:masterClrMapping/>
+  </p:clrMapOvr>
+  <p:transition spd="med"/>
+</p:sld>
+</file>
+
+<file path=ppt/slides/slide27.xml><?xml version="1.0" encoding="utf-8"?>
+<p:sld xmlns:a="http://schemas.openxmlformats.org/drawingml/2006/main" xmlns:r="http://schemas.openxmlformats.org/officeDocument/2006/relationships" xmlns:p="http://schemas.openxmlformats.org/presentationml/2006/main">
+  <p:cSld>
+    <p:spTree>
+      <p:nvGrpSpPr>
+        <p:cNvPr id="1" name=""/>
+        <p:cNvGrpSpPr/>
+        <p:nvPr/>
+      </p:nvGrpSpPr>
+      <p:grpSpPr>
+        <a:xfrm>
+          <a:off x="0" y="0"/>
+          <a:ext cx="0" cy="0"/>
+          <a:chOff x="0" y="0"/>
+          <a:chExt cx="0" cy="0"/>
+        </a:xfrm>
+      </p:grpSpPr>
+      <p:sp>
+        <p:nvSpPr>
           <p:cNvPr id="442" name="Example: Player Scores"/>
           <p:cNvSpPr txBox="1">
             <a:spLocks noGrp="1"/>
@@ -18506,7 +19194,7 @@
 </p:sld>
 </file>
 
-<file path=ppt/slides/slide27.xml><?xml version="1.0" encoding="utf-8"?>
+<file path=ppt/slides/slide28.xml><?xml version="1.0" encoding="utf-8"?>
 <p:sld xmlns:a="http://schemas.openxmlformats.org/drawingml/2006/main" xmlns:r="http://schemas.openxmlformats.org/officeDocument/2006/relationships" xmlns:p="http://schemas.openxmlformats.org/presentationml/2006/main">
   <p:cSld>
     <p:spTree>
@@ -19957,7 +20645,7 @@
 </p:sld>
 </file>
 
-<file path=ppt/slides/slide28.xml><?xml version="1.0" encoding="utf-8"?>
+<file path=ppt/slides/slide29.xml><?xml version="1.0" encoding="utf-8"?>
 <p:sld xmlns:a="http://schemas.openxmlformats.org/drawingml/2006/main" xmlns:r="http://schemas.openxmlformats.org/officeDocument/2006/relationships" xmlns:p="http://schemas.openxmlformats.org/presentationml/2006/main">
   <p:cSld>
     <p:spTree>
@@ -21399,215 +22087,6 @@
             <a:r>
               <a:t>(shallow copy)</a:t>
             </a:r>
-          </a:p>
-        </p:txBody>
-      </p:sp>
-    </p:spTree>
-  </p:cSld>
-  <p:clrMapOvr>
-    <a:masterClrMapping/>
-  </p:clrMapOvr>
-  <p:transition spd="med"/>
-</p:sld>
-</file>
-
-<file path=ppt/slides/slide29.xml><?xml version="1.0" encoding="utf-8"?>
-<p:sld xmlns:a="http://schemas.openxmlformats.org/drawingml/2006/main" xmlns:r="http://schemas.openxmlformats.org/officeDocument/2006/relationships" xmlns:p="http://schemas.openxmlformats.org/presentationml/2006/main">
-  <p:cSld>
-    <p:spTree>
-      <p:nvGrpSpPr>
-        <p:cNvPr id="1" name=""/>
-        <p:cNvGrpSpPr/>
-        <p:nvPr/>
-      </p:nvGrpSpPr>
-      <p:grpSpPr>
-        <a:xfrm>
-          <a:off x="0" y="0"/>
-          <a:ext cx="0" cy="0"/>
-          <a:chOff x="0" y="0"/>
-          <a:chExt cx="0" cy="0"/>
-        </a:xfrm>
-      </p:grpSpPr>
-      <p:sp>
-        <p:nvSpPr>
-          <p:cNvPr id="535" name="def max_score(people):   highest = None   for p in people:     if highest == None or p[&quot;score&quot;] &gt; highest:       highest = p[&quot;score&quot;]   return highest…"/>
-          <p:cNvSpPr txBox="1">
-            <a:spLocks noGrp="1"/>
-          </p:cNvSpPr>
-          <p:nvPr>
-            <p:ph type="body" sz="half" idx="1"/>
-          </p:nvPr>
-        </p:nvSpPr>
-        <p:spPr>
-          <a:xfrm>
-            <a:off x="1333500" y="424160"/>
-            <a:ext cx="11099800" cy="3995242"/>
-          </a:xfrm>
-          <a:prstGeom prst="rect">
-            <a:avLst/>
-          </a:prstGeom>
-        </p:spPr>
-        <p:txBody>
-          <a:bodyPr anchor="t"/>
-          <a:lstStyle/>
-          <a:p>
-            <a:pPr marL="0" lvl="5" indent="0">
-              <a:buSzTx/>
-              <a:buNone/>
-              <a:defRPr sz="2600">
-                <a:latin typeface="Courier"/>
-                <a:ea typeface="Courier"/>
-                <a:cs typeface="Courier"/>
-                <a:sym typeface="Courier"/>
-              </a:defRPr>
-            </a:pPr>
-            <a:r>
-              <a:t>def max_score(</a:t>
-            </a:r>
-            <a:r>
-              <a:rPr b="1"/>
-              <a:t>people</a:t>
-            </a:r>
-            <a:r>
-              <a:t>):</a:t>
-            </a:r>
-            <a:br/>
-            <a:r>
-              <a:t>  highest = None</a:t>
-            </a:r>
-            <a:br/>
-            <a:r>
-              <a:t>  for p in people:</a:t>
-            </a:r>
-            <a:br/>
-            <a:r>
-              <a:t>    if highest == None or p["score"] &gt; highest:</a:t>
-            </a:r>
-            <a:br/>
-            <a:r>
-              <a:t>      highest = p["score"]</a:t>
-            </a:r>
-            <a:br/>
-            <a:r>
-              <a:t>  return highest</a:t>
-            </a:r>
-          </a:p>
-          <a:p>
-            <a:pPr marL="0" lvl="5" indent="0">
-              <a:buSzTx/>
-              <a:buNone/>
-              <a:defRPr sz="2600">
-                <a:latin typeface="Courier"/>
-                <a:ea typeface="Courier"/>
-                <a:cs typeface="Courier"/>
-                <a:sym typeface="Courier"/>
-              </a:defRPr>
-            </a:pPr>
-            <a:r>
-              <a:rPr b="1"/>
-              <a:t>players</a:t>
-            </a:r>
-            <a:r>
-              <a:t> = …</a:t>
-            </a:r>
-            <a:br/>
-            <a:r>
-              <a:t>m = max_score(</a:t>
-            </a:r>
-            <a:r>
-              <a:rPr b="1"/>
-              <a:t>players</a:t>
-            </a:r>
-            <a:r>
-              <a:t>)</a:t>
-            </a:r>
-          </a:p>
-        </p:txBody>
-      </p:sp>
-      <p:sp>
-        <p:nvSpPr>
-          <p:cNvPr id="536" name="Line"/>
-          <p:cNvSpPr/>
-          <p:nvPr/>
-        </p:nvSpPr>
-        <p:spPr>
-          <a:xfrm>
-            <a:off x="203200" y="4889500"/>
-            <a:ext cx="12598400" cy="0"/>
-          </a:xfrm>
-          <a:prstGeom prst="line">
-            <a:avLst/>
-          </a:prstGeom>
-          <a:ln w="101600">
-            <a:solidFill>
-              <a:srgbClr val="000000"/>
-            </a:solidFill>
-            <a:miter lim="400000"/>
-          </a:ln>
-        </p:spPr>
-        <p:txBody>
-          <a:bodyPr lIns="50800" tIns="50800" rIns="50800" bIns="50800" anchor="ctr"/>
-          <a:lstStyle/>
-          <a:p>
-            <a:pPr>
-              <a:defRPr sz="2200" b="0">
-                <a:solidFill>
-                  <a:srgbClr val="FFFFFF"/>
-                </a:solidFill>
-                <a:latin typeface="+mn-lt"/>
-                <a:ea typeface="+mn-ea"/>
-                <a:cs typeface="+mn-cs"/>
-                <a:sym typeface="Gill Sans SemiBold"/>
-              </a:defRPr>
-            </a:pPr>
-            <a:endParaRPr/>
-          </a:p>
-        </p:txBody>
-      </p:sp>
-      <p:sp>
-        <p:nvSpPr>
-          <p:cNvPr id="537" name="Arrow"/>
-          <p:cNvSpPr/>
-          <p:nvPr/>
-        </p:nvSpPr>
-        <p:spPr>
-          <a:xfrm>
-            <a:off x="520700" y="3280993"/>
-            <a:ext cx="681407" cy="681408"/>
-          </a:xfrm>
-          <a:prstGeom prst="rightArrow">
-            <a:avLst>
-              <a:gd name="adj1" fmla="val 29350"/>
-              <a:gd name="adj2" fmla="val 36589"/>
-            </a:avLst>
-          </a:prstGeom>
-          <a:solidFill>
-            <a:schemeClr val="accent5">
-              <a:hueOff val="-82419"/>
-              <a:satOff val="-9513"/>
-              <a:lumOff val="-16343"/>
-            </a:schemeClr>
-          </a:solidFill>
-          <a:ln w="12700">
-            <a:miter lim="400000"/>
-          </a:ln>
-        </p:spPr>
-        <p:txBody>
-          <a:bodyPr lIns="50800" tIns="50800" rIns="50800" bIns="50800" anchor="ctr"/>
-          <a:lstStyle/>
-          <a:p>
-            <a:pPr>
-              <a:defRPr sz="2200" b="0">
-                <a:solidFill>
-                  <a:srgbClr val="FFFFFF"/>
-                </a:solidFill>
-                <a:latin typeface="+mn-lt"/>
-                <a:ea typeface="+mn-ea"/>
-                <a:cs typeface="+mn-cs"/>
-                <a:sym typeface="Gill Sans SemiBold"/>
-              </a:defRPr>
-            </a:pPr>
-            <a:endParaRPr/>
           </a:p>
         </p:txBody>
       </p:sp>
@@ -21922,6 +22401,215 @@
       </p:grpSpPr>
       <p:sp>
         <p:nvSpPr>
+          <p:cNvPr id="535" name="def max_score(people):   highest = None   for p in people:     if highest == None or p[&quot;score&quot;] &gt; highest:       highest = p[&quot;score&quot;]   return highest…"/>
+          <p:cNvSpPr txBox="1">
+            <a:spLocks noGrp="1"/>
+          </p:cNvSpPr>
+          <p:nvPr>
+            <p:ph type="body" sz="half" idx="1"/>
+          </p:nvPr>
+        </p:nvSpPr>
+        <p:spPr>
+          <a:xfrm>
+            <a:off x="1333500" y="424160"/>
+            <a:ext cx="11099800" cy="3995242"/>
+          </a:xfrm>
+          <a:prstGeom prst="rect">
+            <a:avLst/>
+          </a:prstGeom>
+        </p:spPr>
+        <p:txBody>
+          <a:bodyPr anchor="t"/>
+          <a:lstStyle/>
+          <a:p>
+            <a:pPr marL="0" lvl="5" indent="0">
+              <a:buSzTx/>
+              <a:buNone/>
+              <a:defRPr sz="2600">
+                <a:latin typeface="Courier"/>
+                <a:ea typeface="Courier"/>
+                <a:cs typeface="Courier"/>
+                <a:sym typeface="Courier"/>
+              </a:defRPr>
+            </a:pPr>
+            <a:r>
+              <a:t>def max_score(</a:t>
+            </a:r>
+            <a:r>
+              <a:rPr b="1"/>
+              <a:t>people</a:t>
+            </a:r>
+            <a:r>
+              <a:t>):</a:t>
+            </a:r>
+            <a:br/>
+            <a:r>
+              <a:t>  highest = None</a:t>
+            </a:r>
+            <a:br/>
+            <a:r>
+              <a:t>  for p in people:</a:t>
+            </a:r>
+            <a:br/>
+            <a:r>
+              <a:t>    if highest == None or p["score"] &gt; highest:</a:t>
+            </a:r>
+            <a:br/>
+            <a:r>
+              <a:t>      highest = p["score"]</a:t>
+            </a:r>
+            <a:br/>
+            <a:r>
+              <a:t>  return highest</a:t>
+            </a:r>
+          </a:p>
+          <a:p>
+            <a:pPr marL="0" lvl="5" indent="0">
+              <a:buSzTx/>
+              <a:buNone/>
+              <a:defRPr sz="2600">
+                <a:latin typeface="Courier"/>
+                <a:ea typeface="Courier"/>
+                <a:cs typeface="Courier"/>
+                <a:sym typeface="Courier"/>
+              </a:defRPr>
+            </a:pPr>
+            <a:r>
+              <a:rPr b="1"/>
+              <a:t>players</a:t>
+            </a:r>
+            <a:r>
+              <a:t> = …</a:t>
+            </a:r>
+            <a:br/>
+            <a:r>
+              <a:t>m = max_score(</a:t>
+            </a:r>
+            <a:r>
+              <a:rPr b="1"/>
+              <a:t>players</a:t>
+            </a:r>
+            <a:r>
+              <a:t>)</a:t>
+            </a:r>
+          </a:p>
+        </p:txBody>
+      </p:sp>
+      <p:sp>
+        <p:nvSpPr>
+          <p:cNvPr id="536" name="Line"/>
+          <p:cNvSpPr/>
+          <p:nvPr/>
+        </p:nvSpPr>
+        <p:spPr>
+          <a:xfrm>
+            <a:off x="203200" y="4889500"/>
+            <a:ext cx="12598400" cy="0"/>
+          </a:xfrm>
+          <a:prstGeom prst="line">
+            <a:avLst/>
+          </a:prstGeom>
+          <a:ln w="101600">
+            <a:solidFill>
+              <a:srgbClr val="000000"/>
+            </a:solidFill>
+            <a:miter lim="400000"/>
+          </a:ln>
+        </p:spPr>
+        <p:txBody>
+          <a:bodyPr lIns="50800" tIns="50800" rIns="50800" bIns="50800" anchor="ctr"/>
+          <a:lstStyle/>
+          <a:p>
+            <a:pPr>
+              <a:defRPr sz="2200" b="0">
+                <a:solidFill>
+                  <a:srgbClr val="FFFFFF"/>
+                </a:solidFill>
+                <a:latin typeface="+mn-lt"/>
+                <a:ea typeface="+mn-ea"/>
+                <a:cs typeface="+mn-cs"/>
+                <a:sym typeface="Gill Sans SemiBold"/>
+              </a:defRPr>
+            </a:pPr>
+            <a:endParaRPr/>
+          </a:p>
+        </p:txBody>
+      </p:sp>
+      <p:sp>
+        <p:nvSpPr>
+          <p:cNvPr id="537" name="Arrow"/>
+          <p:cNvSpPr/>
+          <p:nvPr/>
+        </p:nvSpPr>
+        <p:spPr>
+          <a:xfrm>
+            <a:off x="520700" y="3280993"/>
+            <a:ext cx="681407" cy="681408"/>
+          </a:xfrm>
+          <a:prstGeom prst="rightArrow">
+            <a:avLst>
+              <a:gd name="adj1" fmla="val 29350"/>
+              <a:gd name="adj2" fmla="val 36589"/>
+            </a:avLst>
+          </a:prstGeom>
+          <a:solidFill>
+            <a:schemeClr val="accent5">
+              <a:hueOff val="-82419"/>
+              <a:satOff val="-9513"/>
+              <a:lumOff val="-16343"/>
+            </a:schemeClr>
+          </a:solidFill>
+          <a:ln w="12700">
+            <a:miter lim="400000"/>
+          </a:ln>
+        </p:spPr>
+        <p:txBody>
+          <a:bodyPr lIns="50800" tIns="50800" rIns="50800" bIns="50800" anchor="ctr"/>
+          <a:lstStyle/>
+          <a:p>
+            <a:pPr>
+              <a:defRPr sz="2200" b="0">
+                <a:solidFill>
+                  <a:srgbClr val="FFFFFF"/>
+                </a:solidFill>
+                <a:latin typeface="+mn-lt"/>
+                <a:ea typeface="+mn-ea"/>
+                <a:cs typeface="+mn-cs"/>
+                <a:sym typeface="Gill Sans SemiBold"/>
+              </a:defRPr>
+            </a:pPr>
+            <a:endParaRPr/>
+          </a:p>
+        </p:txBody>
+      </p:sp>
+    </p:spTree>
+  </p:cSld>
+  <p:clrMapOvr>
+    <a:masterClrMapping/>
+  </p:clrMapOvr>
+  <p:transition spd="med"/>
+</p:sld>
+</file>
+
+<file path=ppt/slides/slide31.xml><?xml version="1.0" encoding="utf-8"?>
+<p:sld xmlns:a="http://schemas.openxmlformats.org/drawingml/2006/main" xmlns:r="http://schemas.openxmlformats.org/officeDocument/2006/relationships" xmlns:p="http://schemas.openxmlformats.org/presentationml/2006/main">
+  <p:cSld>
+    <p:spTree>
+      <p:nvGrpSpPr>
+        <p:cNvPr id="1" name=""/>
+        <p:cNvGrpSpPr/>
+        <p:nvPr/>
+      </p:nvGrpSpPr>
+      <p:grpSpPr>
+        <a:xfrm>
+          <a:off x="0" y="0"/>
+          <a:ext cx="0" cy="0"/>
+          <a:chOff x="0" y="0"/>
+          <a:chExt cx="0" cy="0"/>
+        </a:xfrm>
+      </p:grpSpPr>
+      <p:sp>
+        <p:nvSpPr>
           <p:cNvPr id="539" name="def max_score(people):   highest = None   for p in people:     if highest == None or p[&quot;score&quot;] &gt; highest:       highest = p[&quot;score&quot;]   return highest…"/>
           <p:cNvSpPr txBox="1">
             <a:spLocks noGrp="1"/>
@@ -23147,7 +23835,7 @@
 </p:sld>
 </file>
 
-<file path=ppt/slides/slide31.xml><?xml version="1.0" encoding="utf-8"?>
+<file path=ppt/slides/slide32.xml><?xml version="1.0" encoding="utf-8"?>
 <p:sld xmlns:a="http://schemas.openxmlformats.org/drawingml/2006/main" xmlns:r="http://schemas.openxmlformats.org/officeDocument/2006/relationships" xmlns:p="http://schemas.openxmlformats.org/presentationml/2006/main">
   <p:cSld>
     <p:spTree>
@@ -24610,7 +25298,7 @@
 </p:sld>
 </file>
 
-<file path=ppt/slides/slide32.xml><?xml version="1.0" encoding="utf-8"?>
+<file path=ppt/slides/slide33.xml><?xml version="1.0" encoding="utf-8"?>
 <p:sld xmlns:a="http://schemas.openxmlformats.org/drawingml/2006/main" xmlns:r="http://schemas.openxmlformats.org/officeDocument/2006/relationships" xmlns:p="http://schemas.openxmlformats.org/presentationml/2006/main">
   <p:cSld>
     <p:spTree>
@@ -26151,7 +26839,7 @@
 </p:sld>
 </file>
 
-<file path=ppt/slides/slide33.xml><?xml version="1.0" encoding="utf-8"?>
+<file path=ppt/slides/slide34.xml><?xml version="1.0" encoding="utf-8"?>
 <p:sld xmlns:a="http://schemas.openxmlformats.org/drawingml/2006/main" xmlns:r="http://schemas.openxmlformats.org/officeDocument/2006/relationships" xmlns:p="http://schemas.openxmlformats.org/presentationml/2006/main">
   <p:cSld>
     <p:spTree>
@@ -27619,7 +28307,7 @@
 </p:sld>
 </file>
 
-<file path=ppt/slides/slide34.xml><?xml version="1.0" encoding="utf-8"?>
+<file path=ppt/slides/slide35.xml><?xml version="1.0" encoding="utf-8"?>
 <p:sld xmlns:a="http://schemas.openxmlformats.org/drawingml/2006/main" xmlns:r="http://schemas.openxmlformats.org/officeDocument/2006/relationships" xmlns:p="http://schemas.openxmlformats.org/presentationml/2006/main">
   <p:cSld>
     <p:spTree>
@@ -29200,7 +29888,7 @@
 </p:sld>
 </file>
 
-<file path=ppt/slides/slide35.xml><?xml version="1.0" encoding="utf-8"?>
+<file path=ppt/slides/slide36.xml><?xml version="1.0" encoding="utf-8"?>
 <p:sld xmlns:a="http://schemas.openxmlformats.org/drawingml/2006/main" xmlns:r="http://schemas.openxmlformats.org/officeDocument/2006/relationships" xmlns:p="http://schemas.openxmlformats.org/presentationml/2006/main">
   <p:cSld>
     <p:spTree>
@@ -30654,7 +31342,7 @@
 </p:sld>
 </file>
 
-<file path=ppt/slides/slide36.xml><?xml version="1.0" encoding="utf-8"?>
+<file path=ppt/slides/slide37.xml><?xml version="1.0" encoding="utf-8"?>
 <p:sld xmlns:a="http://schemas.openxmlformats.org/drawingml/2006/main" xmlns:r="http://schemas.openxmlformats.org/officeDocument/2006/relationships" xmlns:p="http://schemas.openxmlformats.org/presentationml/2006/main">
   <p:cSld>
     <p:spTree>
@@ -30882,7 +31570,7 @@
 </p:sld>
 </file>
 
-<file path=ppt/slides/slide37.xml><?xml version="1.0" encoding="utf-8"?>
+<file path=ppt/slides/slide38.xml><?xml version="1.0" encoding="utf-8"?>
 <p:sld xmlns:a="http://schemas.openxmlformats.org/drawingml/2006/main" xmlns:r="http://schemas.openxmlformats.org/officeDocument/2006/relationships" xmlns:p="http://schemas.openxmlformats.org/presentationml/2006/main">
   <p:cSld>
     <p:spTree>
@@ -32145,7 +32833,7 @@
 </p:sld>
 </file>
 
-<file path=ppt/slides/slide38.xml><?xml version="1.0" encoding="utf-8"?>
+<file path=ppt/slides/slide39.xml><?xml version="1.0" encoding="utf-8"?>
 <p:sld xmlns:a="http://schemas.openxmlformats.org/drawingml/2006/main" xmlns:r="http://schemas.openxmlformats.org/officeDocument/2006/relationships" xmlns:p="http://schemas.openxmlformats.org/presentationml/2006/main">
   <p:cSld>
     <p:spTree>
@@ -33611,7 +34299,168 @@
 </p:sld>
 </file>
 
-<file path=ppt/slides/slide39.xml><?xml version="1.0" encoding="utf-8"?>
+<file path=ppt/slides/slide4.xml><?xml version="1.0" encoding="utf-8"?>
+<p:sld xmlns:a="http://schemas.openxmlformats.org/drawingml/2006/main" xmlns:r="http://schemas.openxmlformats.org/officeDocument/2006/relationships" xmlns:p="http://schemas.openxmlformats.org/presentationml/2006/main">
+  <p:cSld>
+    <p:spTree>
+      <p:nvGrpSpPr>
+        <p:cNvPr id="1" name=""/>
+        <p:cNvGrpSpPr/>
+        <p:nvPr/>
+      </p:nvGrpSpPr>
+      <p:grpSpPr>
+        <a:xfrm>
+          <a:off x="0" y="0"/>
+          <a:ext cx="0" cy="0"/>
+          <a:chOff x="0" y="0"/>
+          <a:chExt cx="0" cy="0"/>
+        </a:xfrm>
+      </p:grpSpPr>
+      <p:sp>
+        <p:nvSpPr>
+          <p:cNvPr id="170" name="Today's Outline"/>
+          <p:cNvSpPr txBox="1">
+            <a:spLocks noGrp="1"/>
+          </p:cNvSpPr>
+          <p:nvPr>
+            <p:ph type="title"/>
+          </p:nvPr>
+        </p:nvSpPr>
+        <p:spPr>
+          <a:xfrm>
+            <a:off x="952500" y="254000"/>
+            <a:ext cx="11099800" cy="902345"/>
+          </a:xfrm>
+          <a:prstGeom prst="rect">
+            <a:avLst/>
+          </a:prstGeom>
+        </p:spPr>
+        <p:txBody>
+          <a:bodyPr/>
+          <a:lstStyle>
+            <a:lvl1pPr algn="l">
+              <a:defRPr sz="4800"/>
+            </a:lvl1pPr>
+          </a:lstStyle>
+          <a:p>
+            <a:r>
+              <a:t>Today's Outline</a:t>
+            </a:r>
+          </a:p>
+        </p:txBody>
+      </p:sp>
+      <p:sp>
+        <p:nvSpPr>
+          <p:cNvPr id="171" name="Review…"/>
+          <p:cNvSpPr txBox="1">
+            <a:spLocks noGrp="1"/>
+          </p:cNvSpPr>
+          <p:nvPr>
+            <p:ph type="body" idx="1"/>
+          </p:nvPr>
+        </p:nvSpPr>
+        <p:spPr>
+          <a:xfrm>
+            <a:off x="952500" y="1587896"/>
+            <a:ext cx="11099800" cy="7289404"/>
+          </a:xfrm>
+          <a:prstGeom prst="rect">
+            <a:avLst/>
+          </a:prstGeom>
+        </p:spPr>
+        <p:txBody>
+          <a:bodyPr anchor="t"/>
+          <a:lstStyle/>
+          <a:p>
+            <a:pPr marL="0" lvl="5" indent="0">
+              <a:buSzTx/>
+              <a:buNone/>
+              <a:defRPr>
+                <a:solidFill>
+                  <a:schemeClr val="accent5">
+                    <a:hueOff val="-82419"/>
+                    <a:satOff val="-9513"/>
+                    <a:lumOff val="-16343"/>
+                  </a:schemeClr>
+                </a:solidFill>
+              </a:defRPr>
+            </a:pPr>
+            <a:r>
+              <a:t>Review</a:t>
+            </a:r>
+          </a:p>
+          <a:p>
+            <a:pPr marL="0" lvl="5" indent="0">
+              <a:buSzTx/>
+              <a:buNone/>
+            </a:pPr>
+            <a:r>
+              <a:t>More references</a:t>
+            </a:r>
+          </a:p>
+          <a:p>
+            <a:pPr marL="0" lvl="5" indent="0">
+              <a:buSzTx/>
+              <a:buNone/>
+            </a:pPr>
+            <a:r>
+              <a:t>Copying</a:t>
+            </a:r>
+          </a:p>
+          <a:p>
+            <a:pPr marL="635000" indent="-444500">
+              <a:spcBef>
+                <a:spcPts val="0"/>
+              </a:spcBef>
+              <a:defRPr sz="2800"/>
+            </a:pPr>
+            <a:r>
+              <a:t>reference</a:t>
+            </a:r>
+          </a:p>
+          <a:p>
+            <a:pPr marL="635000" indent="-444500">
+              <a:spcBef>
+                <a:spcPts val="0"/>
+              </a:spcBef>
+              <a:defRPr sz="2800"/>
+            </a:pPr>
+            <a:r>
+              <a:t>shallow</a:t>
+            </a:r>
+          </a:p>
+          <a:p>
+            <a:pPr marL="635000" indent="-444500">
+              <a:spcBef>
+                <a:spcPts val="0"/>
+              </a:spcBef>
+              <a:defRPr sz="2800"/>
+            </a:pPr>
+            <a:r>
+              <a:t>deep</a:t>
+            </a:r>
+          </a:p>
+          <a:p>
+            <a:pPr marL="0" lvl="5" indent="0">
+              <a:buSzTx/>
+              <a:buNone/>
+            </a:pPr>
+            <a:r>
+              <a:t>Worksheet</a:t>
+            </a:r>
+          </a:p>
+        </p:txBody>
+      </p:sp>
+    </p:spTree>
+  </p:cSld>
+  <p:clrMapOvr>
+    <a:masterClrMapping/>
+  </p:clrMapOvr>
+  <p:transition spd="med"/>
+</p:sld>
+</file>
+
+<file path=ppt/slides/slide40.xml><?xml version="1.0" encoding="utf-8"?>
 <p:sld xmlns:a="http://schemas.openxmlformats.org/drawingml/2006/main" xmlns:r="http://schemas.openxmlformats.org/officeDocument/2006/relationships" xmlns:p="http://schemas.openxmlformats.org/presentationml/2006/main">
   <p:cSld>
     <p:spTree>
@@ -35077,168 +35926,7 @@
 </p:sld>
 </file>
 
-<file path=ppt/slides/slide4.xml><?xml version="1.0" encoding="utf-8"?>
-<p:sld xmlns:a="http://schemas.openxmlformats.org/drawingml/2006/main" xmlns:r="http://schemas.openxmlformats.org/officeDocument/2006/relationships" xmlns:p="http://schemas.openxmlformats.org/presentationml/2006/main">
-  <p:cSld>
-    <p:spTree>
-      <p:nvGrpSpPr>
-        <p:cNvPr id="1" name=""/>
-        <p:cNvGrpSpPr/>
-        <p:nvPr/>
-      </p:nvGrpSpPr>
-      <p:grpSpPr>
-        <a:xfrm>
-          <a:off x="0" y="0"/>
-          <a:ext cx="0" cy="0"/>
-          <a:chOff x="0" y="0"/>
-          <a:chExt cx="0" cy="0"/>
-        </a:xfrm>
-      </p:grpSpPr>
-      <p:sp>
-        <p:nvSpPr>
-          <p:cNvPr id="170" name="Today's Outline"/>
-          <p:cNvSpPr txBox="1">
-            <a:spLocks noGrp="1"/>
-          </p:cNvSpPr>
-          <p:nvPr>
-            <p:ph type="title"/>
-          </p:nvPr>
-        </p:nvSpPr>
-        <p:spPr>
-          <a:xfrm>
-            <a:off x="952500" y="254000"/>
-            <a:ext cx="11099800" cy="902345"/>
-          </a:xfrm>
-          <a:prstGeom prst="rect">
-            <a:avLst/>
-          </a:prstGeom>
-        </p:spPr>
-        <p:txBody>
-          <a:bodyPr/>
-          <a:lstStyle>
-            <a:lvl1pPr algn="l">
-              <a:defRPr sz="4800"/>
-            </a:lvl1pPr>
-          </a:lstStyle>
-          <a:p>
-            <a:r>
-              <a:t>Today's Outline</a:t>
-            </a:r>
-          </a:p>
-        </p:txBody>
-      </p:sp>
-      <p:sp>
-        <p:nvSpPr>
-          <p:cNvPr id="171" name="Review…"/>
-          <p:cNvSpPr txBox="1">
-            <a:spLocks noGrp="1"/>
-          </p:cNvSpPr>
-          <p:nvPr>
-            <p:ph type="body" idx="1"/>
-          </p:nvPr>
-        </p:nvSpPr>
-        <p:spPr>
-          <a:xfrm>
-            <a:off x="952500" y="1587896"/>
-            <a:ext cx="11099800" cy="7289404"/>
-          </a:xfrm>
-          <a:prstGeom prst="rect">
-            <a:avLst/>
-          </a:prstGeom>
-        </p:spPr>
-        <p:txBody>
-          <a:bodyPr anchor="t"/>
-          <a:lstStyle/>
-          <a:p>
-            <a:pPr marL="0" lvl="5" indent="0">
-              <a:buSzTx/>
-              <a:buNone/>
-              <a:defRPr>
-                <a:solidFill>
-                  <a:schemeClr val="accent5">
-                    <a:hueOff val="-82419"/>
-                    <a:satOff val="-9513"/>
-                    <a:lumOff val="-16343"/>
-                  </a:schemeClr>
-                </a:solidFill>
-              </a:defRPr>
-            </a:pPr>
-            <a:r>
-              <a:t>Review</a:t>
-            </a:r>
-          </a:p>
-          <a:p>
-            <a:pPr marL="0" lvl="5" indent="0">
-              <a:buSzTx/>
-              <a:buNone/>
-            </a:pPr>
-            <a:r>
-              <a:t>More references</a:t>
-            </a:r>
-          </a:p>
-          <a:p>
-            <a:pPr marL="0" lvl="5" indent="0">
-              <a:buSzTx/>
-              <a:buNone/>
-            </a:pPr>
-            <a:r>
-              <a:t>Copying</a:t>
-            </a:r>
-          </a:p>
-          <a:p>
-            <a:pPr marL="635000" indent="-444500">
-              <a:spcBef>
-                <a:spcPts val="0"/>
-              </a:spcBef>
-              <a:defRPr sz="2800"/>
-            </a:pPr>
-            <a:r>
-              <a:t>reference</a:t>
-            </a:r>
-          </a:p>
-          <a:p>
-            <a:pPr marL="635000" indent="-444500">
-              <a:spcBef>
-                <a:spcPts val="0"/>
-              </a:spcBef>
-              <a:defRPr sz="2800"/>
-            </a:pPr>
-            <a:r>
-              <a:t>shallow</a:t>
-            </a:r>
-          </a:p>
-          <a:p>
-            <a:pPr marL="635000" indent="-444500">
-              <a:spcBef>
-                <a:spcPts val="0"/>
-              </a:spcBef>
-              <a:defRPr sz="2800"/>
-            </a:pPr>
-            <a:r>
-              <a:t>deep</a:t>
-            </a:r>
-          </a:p>
-          <a:p>
-            <a:pPr marL="0" lvl="5" indent="0">
-              <a:buSzTx/>
-              <a:buNone/>
-            </a:pPr>
-            <a:r>
-              <a:t>Worksheet</a:t>
-            </a:r>
-          </a:p>
-        </p:txBody>
-      </p:sp>
-    </p:spTree>
-  </p:cSld>
-  <p:clrMapOvr>
-    <a:masterClrMapping/>
-  </p:clrMapOvr>
-  <p:transition spd="med"/>
-</p:sld>
-</file>
-
-<file path=ppt/slides/slide40.xml><?xml version="1.0" encoding="utf-8"?>
+<file path=ppt/slides/slide41.xml><?xml version="1.0" encoding="utf-8"?>
 <p:sld xmlns:a="http://schemas.openxmlformats.org/drawingml/2006/main" xmlns:r="http://schemas.openxmlformats.org/officeDocument/2006/relationships" xmlns:p="http://schemas.openxmlformats.org/presentationml/2006/main">
   <p:cSld>
     <p:spTree>
@@ -36818,7 +37506,7 @@
 </p:sld>
 </file>
 
-<file path=ppt/slides/slide41.xml><?xml version="1.0" encoding="utf-8"?>
+<file path=ppt/slides/slide42.xml><?xml version="1.0" encoding="utf-8"?>
 <p:sld xmlns:a="http://schemas.openxmlformats.org/drawingml/2006/main" xmlns:r="http://schemas.openxmlformats.org/officeDocument/2006/relationships" xmlns:p="http://schemas.openxmlformats.org/presentationml/2006/main">
   <p:cSld>
     <p:spTree>
@@ -38644,7 +39332,7 @@
 </p:sld>
 </file>
 
-<file path=ppt/slides/slide42.xml><?xml version="1.0" encoding="utf-8"?>
+<file path=ppt/slides/slide43.xml><?xml version="1.0" encoding="utf-8"?>
 <p:sld xmlns:a="http://schemas.openxmlformats.org/drawingml/2006/main" xmlns:r="http://schemas.openxmlformats.org/officeDocument/2006/relationships" xmlns:p="http://schemas.openxmlformats.org/presentationml/2006/main">
   <p:cSld>
     <p:spTree>
@@ -40470,7 +41158,7 @@
 </p:sld>
 </file>
 
-<file path=ppt/slides/slide43.xml><?xml version="1.0" encoding="utf-8"?>
+<file path=ppt/slides/slide44.xml><?xml version="1.0" encoding="utf-8"?>
 <p:sld xmlns:a="http://schemas.openxmlformats.org/drawingml/2006/main" xmlns:r="http://schemas.openxmlformats.org/officeDocument/2006/relationships" xmlns:p="http://schemas.openxmlformats.org/presentationml/2006/main">
   <p:cSld>
     <p:spTree>
@@ -42338,7 +43026,7 @@
 </p:sld>
 </file>
 
-<file path=ppt/slides/slide44.xml><?xml version="1.0" encoding="utf-8"?>
+<file path=ppt/slides/slide45.xml><?xml version="1.0" encoding="utf-8"?>
 <p:sld xmlns:a="http://schemas.openxmlformats.org/drawingml/2006/main" xmlns:r="http://schemas.openxmlformats.org/officeDocument/2006/relationships" xmlns:p="http://schemas.openxmlformats.org/presentationml/2006/main">
   <p:cSld>
     <p:spTree>
@@ -43792,7 +44480,7 @@
 </p:sld>
 </file>
 
-<file path=ppt/slides/slide45.xml><?xml version="1.0" encoding="utf-8"?>
+<file path=ppt/slides/slide46.xml><?xml version="1.0" encoding="utf-8"?>
 <p:sld xmlns:a="http://schemas.openxmlformats.org/drawingml/2006/main" xmlns:r="http://schemas.openxmlformats.org/officeDocument/2006/relationships" xmlns:p="http://schemas.openxmlformats.org/presentationml/2006/main">
   <p:cSld>
     <p:spTree>
@@ -43980,7 +44668,7 @@
 </p:sld>
 </file>
 
-<file path=ppt/slides/slide46.xml><?xml version="1.0" encoding="utf-8"?>
+<file path=ppt/slides/slide47.xml><?xml version="1.0" encoding="utf-8"?>
 <p:sld xmlns:a="http://schemas.openxmlformats.org/drawingml/2006/main" xmlns:r="http://schemas.openxmlformats.org/officeDocument/2006/relationships" xmlns:p="http://schemas.openxmlformats.org/presentationml/2006/main">
   <p:cSld>
     <p:spTree>
@@ -45203,7 +45891,7 @@
 </p:sld>
 </file>
 
-<file path=ppt/slides/slide47.xml><?xml version="1.0" encoding="utf-8"?>
+<file path=ppt/slides/slide48.xml><?xml version="1.0" encoding="utf-8"?>
 <p:sld xmlns:a="http://schemas.openxmlformats.org/drawingml/2006/main" xmlns:r="http://schemas.openxmlformats.org/officeDocument/2006/relationships" xmlns:p="http://schemas.openxmlformats.org/presentationml/2006/main">
   <p:cSld>
     <p:spTree>
@@ -46760,7 +47448,7 @@
 </p:sld>
 </file>
 
-<file path=ppt/slides/slide48.xml><?xml version="1.0" encoding="utf-8"?>
+<file path=ppt/slides/slide49.xml><?xml version="1.0" encoding="utf-8"?>
 <p:sld xmlns:a="http://schemas.openxmlformats.org/drawingml/2006/main" xmlns:r="http://schemas.openxmlformats.org/officeDocument/2006/relationships" xmlns:p="http://schemas.openxmlformats.org/presentationml/2006/main">
   <p:cSld>
     <p:spTree>
@@ -49082,7 +49770,66 @@
 </p:sld>
 </file>
 
-<file path=ppt/slides/slide49.xml><?xml version="1.0" encoding="utf-8"?>
+<file path=ppt/slides/slide5.xml><?xml version="1.0" encoding="utf-8"?>
+<p:sld xmlns:a="http://schemas.openxmlformats.org/drawingml/2006/main" xmlns:r="http://schemas.openxmlformats.org/officeDocument/2006/relationships" xmlns:p="http://schemas.openxmlformats.org/presentationml/2006/main">
+  <p:cSld>
+    <p:spTree>
+      <p:nvGrpSpPr>
+        <p:cNvPr id="1" name=""/>
+        <p:cNvGrpSpPr/>
+        <p:nvPr/>
+      </p:nvGrpSpPr>
+      <p:grpSpPr>
+        <a:xfrm>
+          <a:off x="0" y="0"/>
+          <a:ext cx="0" cy="0"/>
+          <a:chOff x="0" y="0"/>
+          <a:chExt cx="0" cy="0"/>
+        </a:xfrm>
+      </p:grpSpPr>
+      <p:sp>
+        <p:nvSpPr>
+          <p:cNvPr id="173" name="Worksheet Problem 1"/>
+          <p:cNvSpPr txBox="1">
+            <a:spLocks noGrp="1"/>
+          </p:cNvSpPr>
+          <p:nvPr>
+            <p:ph type="title"/>
+          </p:nvPr>
+        </p:nvSpPr>
+        <p:spPr>
+          <a:xfrm>
+            <a:off x="952500" y="4425627"/>
+            <a:ext cx="11099800" cy="902346"/>
+          </a:xfrm>
+          <a:prstGeom prst="rect">
+            <a:avLst/>
+          </a:prstGeom>
+        </p:spPr>
+        <p:txBody>
+          <a:bodyPr/>
+          <a:lstStyle>
+            <a:lvl1pPr>
+              <a:defRPr sz="4800"/>
+            </a:lvl1pPr>
+          </a:lstStyle>
+          <a:p>
+            <a:r>
+              <a:t>Worksheet Problem 1</a:t>
+            </a:r>
+          </a:p>
+        </p:txBody>
+      </p:sp>
+    </p:spTree>
+  </p:cSld>
+  <p:clrMapOvr>
+    <a:masterClrMapping/>
+  </p:clrMapOvr>
+  <p:transition spd="med"/>
+</p:sld>
+</file>
+
+<file path=ppt/slides/slide50.xml><?xml version="1.0" encoding="utf-8"?>
 <p:sld xmlns:a="http://schemas.openxmlformats.org/drawingml/2006/main" xmlns:r="http://schemas.openxmlformats.org/officeDocument/2006/relationships" xmlns:p="http://schemas.openxmlformats.org/presentationml/2006/main">
   <p:cSld>
     <p:spTree>
@@ -51422,66 +52169,7 @@
 </p:sld>
 </file>
 
-<file path=ppt/slides/slide5.xml><?xml version="1.0" encoding="utf-8"?>
-<p:sld xmlns:a="http://schemas.openxmlformats.org/drawingml/2006/main" xmlns:r="http://schemas.openxmlformats.org/officeDocument/2006/relationships" xmlns:p="http://schemas.openxmlformats.org/presentationml/2006/main">
-  <p:cSld>
-    <p:spTree>
-      <p:nvGrpSpPr>
-        <p:cNvPr id="1" name=""/>
-        <p:cNvGrpSpPr/>
-        <p:nvPr/>
-      </p:nvGrpSpPr>
-      <p:grpSpPr>
-        <a:xfrm>
-          <a:off x="0" y="0"/>
-          <a:ext cx="0" cy="0"/>
-          <a:chOff x="0" y="0"/>
-          <a:chExt cx="0" cy="0"/>
-        </a:xfrm>
-      </p:grpSpPr>
-      <p:sp>
-        <p:nvSpPr>
-          <p:cNvPr id="173" name="Worksheet Problem 1"/>
-          <p:cNvSpPr txBox="1">
-            <a:spLocks noGrp="1"/>
-          </p:cNvSpPr>
-          <p:nvPr>
-            <p:ph type="title"/>
-          </p:nvPr>
-        </p:nvSpPr>
-        <p:spPr>
-          <a:xfrm>
-            <a:off x="952500" y="4425627"/>
-            <a:ext cx="11099800" cy="902346"/>
-          </a:xfrm>
-          <a:prstGeom prst="rect">
-            <a:avLst/>
-          </a:prstGeom>
-        </p:spPr>
-        <p:txBody>
-          <a:bodyPr/>
-          <a:lstStyle>
-            <a:lvl1pPr>
-              <a:defRPr sz="4800"/>
-            </a:lvl1pPr>
-          </a:lstStyle>
-          <a:p>
-            <a:r>
-              <a:t>Worksheet Problem 1</a:t>
-            </a:r>
-          </a:p>
-        </p:txBody>
-      </p:sp>
-    </p:spTree>
-  </p:cSld>
-  <p:clrMapOvr>
-    <a:masterClrMapping/>
-  </p:clrMapOvr>
-  <p:transition spd="med"/>
-</p:sld>
-</file>
-
-<file path=ppt/slides/slide50.xml><?xml version="1.0" encoding="utf-8"?>
+<file path=ppt/slides/slide51.xml><?xml version="1.0" encoding="utf-8"?>
 <p:sld xmlns:a="http://schemas.openxmlformats.org/drawingml/2006/main" xmlns:r="http://schemas.openxmlformats.org/officeDocument/2006/relationships" xmlns:p="http://schemas.openxmlformats.org/presentationml/2006/main">
   <p:cSld>
     <p:spTree>
@@ -53868,7 +54556,7 @@
 </p:sld>
 </file>
 
-<file path=ppt/slides/slide51.xml><?xml version="1.0" encoding="utf-8"?>
+<file path=ppt/slides/slide52.xml><?xml version="1.0" encoding="utf-8"?>
 <p:sld xmlns:a="http://schemas.openxmlformats.org/drawingml/2006/main" xmlns:r="http://schemas.openxmlformats.org/officeDocument/2006/relationships" xmlns:p="http://schemas.openxmlformats.org/presentationml/2006/main">
   <p:cSld>
     <p:spTree>
@@ -54029,7 +54717,7 @@
 </p:sld>
 </file>
 
-<file path=ppt/slides/slide52.xml><?xml version="1.0" encoding="utf-8"?>
+<file path=ppt/slides/slide53.xml><?xml version="1.0" encoding="utf-8"?>
 <p:sld xmlns:a="http://schemas.openxmlformats.org/drawingml/2006/main" xmlns:r="http://schemas.openxmlformats.org/officeDocument/2006/relationships" xmlns:p="http://schemas.openxmlformats.org/presentationml/2006/main">
   <p:cSld>
     <p:spTree>

</xml_diff>